<commit_message>
añadido pannel adminitrativo nextj  Backoffice
</commit_message>
<xml_diff>
--- a/public/documentation/arquitectura php.pptx
+++ b/public/documentation/arquitectura php.pptx
@@ -7,6 +7,7 @@
   <p:sldIdLst>
     <p:sldId id="256" r:id="rId2"/>
     <p:sldId id="257" r:id="rId3"/>
+    <p:sldId id="258" r:id="rId4"/>
   </p:sldIdLst>
   <p:sldSz cx="12192000" cy="6858000"/>
   <p:notesSz cx="6858000" cy="9144000"/>
@@ -105,6 +106,11 @@
       </a:defRPr>
     </a:lvl9pPr>
   </p:defaultTextStyle>
+  <p:extLst>
+    <p:ext uri="{EFAFB233-063F-42B5-8137-9DF3F51BA10A}">
+      <p15:sldGuideLst xmlns:p15="http://schemas.microsoft.com/office/powerpoint/2012/main"/>
+    </p:ext>
+  </p:extLst>
 </p:presentation>
 </file>
 
@@ -261,7 +267,7 @@
           <a:p>
             <a:fld id="{C128FA71-3A18-48C0-980F-4B68F7F63042}" type="datetime1">
               <a:rPr lang="en-US" smtClean="0"/>
-              <a:t>8/19/2025</a:t>
+              <a:t>8/21/2025</a:t>
             </a:fld>
             <a:endParaRPr lang="en-US"/>
           </a:p>
@@ -469,7 +475,7 @@
           <a:p>
             <a:fld id="{7104EDB3-C0E8-45F8-9E1D-1B6C8D1880C0}" type="datetime1">
               <a:rPr lang="en-US" smtClean="0"/>
-              <a:t>8/19/2025</a:t>
+              <a:t>8/21/2025</a:t>
             </a:fld>
             <a:endParaRPr lang="en-US"/>
           </a:p>
@@ -679,7 +685,7 @@
           <a:p>
             <a:fld id="{9CF0EC4B-54ED-4041-B552-9BA760FA3DBA}" type="datetime1">
               <a:rPr lang="en-US" smtClean="0"/>
-              <a:t>8/19/2025</a:t>
+              <a:t>8/21/2025</a:t>
             </a:fld>
             <a:endParaRPr lang="en-US"/>
           </a:p>
@@ -877,7 +883,7 @@
           <a:p>
             <a:fld id="{51C1210E-201E-4473-82AC-2466F5386C38}" type="datetime1">
               <a:rPr lang="en-US" smtClean="0"/>
-              <a:t>8/19/2025</a:t>
+              <a:t>8/21/2025</a:t>
             </a:fld>
             <a:endParaRPr lang="en-US"/>
           </a:p>
@@ -1155,7 +1161,7 @@
           <a:p>
             <a:fld id="{B01EA198-6CAB-4B8F-B93F-1F9C8C4B6CE7}" type="datetime1">
               <a:rPr lang="en-US" smtClean="0"/>
-              <a:t>8/19/2025</a:t>
+              <a:t>8/21/2025</a:t>
             </a:fld>
             <a:endParaRPr lang="en-US"/>
           </a:p>
@@ -1427,7 +1433,7 @@
           <a:p>
             <a:fld id="{CA06041F-4525-44D5-AA4F-332294BF1F56}" type="datetime1">
               <a:rPr lang="en-US" smtClean="0"/>
-              <a:t>8/19/2025</a:t>
+              <a:t>8/21/2025</a:t>
             </a:fld>
             <a:endParaRPr lang="en-US"/>
           </a:p>
@@ -1851,7 +1857,7 @@
           <a:p>
             <a:fld id="{F9557091-BBDF-4EB9-BA6B-2BB67AC4FC0F}" type="datetime1">
               <a:rPr lang="en-US" smtClean="0"/>
-              <a:t>8/19/2025</a:t>
+              <a:t>8/21/2025</a:t>
             </a:fld>
             <a:endParaRPr lang="en-US"/>
           </a:p>
@@ -1992,7 +1998,7 @@
           <a:p>
             <a:fld id="{2D6B226B-77A6-410C-9796-083F278E0125}" type="datetime1">
               <a:rPr lang="en-US" smtClean="0"/>
-              <a:t>8/19/2025</a:t>
+              <a:t>8/21/2025</a:t>
             </a:fld>
             <a:endParaRPr lang="en-US"/>
           </a:p>
@@ -2105,7 +2111,7 @@
           <a:p>
             <a:fld id="{A23A578B-D289-4C40-8593-3D356C49DA58}" type="datetime1">
               <a:rPr lang="en-US" smtClean="0"/>
-              <a:t>8/19/2025</a:t>
+              <a:t>8/21/2025</a:t>
             </a:fld>
             <a:endParaRPr lang="en-US"/>
           </a:p>
@@ -2424,7 +2430,7 @@
           <a:p>
             <a:fld id="{713DFAE3-14DB-48A7-A80F-80DDB072CE3D}" type="datetime1">
               <a:rPr lang="en-US" smtClean="0"/>
-              <a:t>8/19/2025</a:t>
+              <a:t>8/21/2025</a:t>
             </a:fld>
             <a:endParaRPr lang="en-US"/>
           </a:p>
@@ -2718,7 +2724,7 @@
           <a:p>
             <a:fld id="{92C5EAEF-6478-4102-8F5D-A5FE9FC97ACB}" type="datetime1">
               <a:rPr lang="en-US" smtClean="0"/>
-              <a:t>8/19/2025</a:t>
+              <a:t>8/21/2025</a:t>
             </a:fld>
             <a:endParaRPr lang="en-US"/>
           </a:p>
@@ -2959,7 +2965,7 @@
           <a:p>
             <a:fld id="{67F45AC6-C491-4585-A584-9CE2AF7D5500}" type="datetime1">
               <a:rPr lang="en-US" smtClean="0"/>
-              <a:t>8/19/2025</a:t>
+              <a:t>8/21/2025</a:t>
             </a:fld>
             <a:endParaRPr lang="en-US"/>
           </a:p>
@@ -9792,6 +9798,158 @@
 </p:sld>
 </file>
 
+<file path=ppt/slides/slide3.xml><?xml version="1.0" encoding="utf-8"?>
+<p:sld xmlns:a="http://schemas.openxmlformats.org/drawingml/2006/main" xmlns:r="http://schemas.openxmlformats.org/officeDocument/2006/relationships" xmlns:p="http://schemas.openxmlformats.org/presentationml/2006/main">
+  <p:cSld>
+    <p:spTree>
+      <p:nvGrpSpPr>
+        <p:cNvPr id="1" name=""/>
+        <p:cNvGrpSpPr/>
+        <p:nvPr/>
+      </p:nvGrpSpPr>
+      <p:grpSpPr>
+        <a:xfrm>
+          <a:off x="0" y="0"/>
+          <a:ext cx="0" cy="0"/>
+          <a:chOff x="0" y="0"/>
+          <a:chExt cx="0" cy="0"/>
+        </a:xfrm>
+      </p:grpSpPr>
+      <p:pic>
+        <p:nvPicPr>
+          <p:cNvPr id="2" name="Picture 2">
+            <a:extLst>
+              <a:ext uri="{FF2B5EF4-FFF2-40B4-BE49-F238E27FC236}">
+                <a16:creationId xmlns:a16="http://schemas.microsoft.com/office/drawing/2014/main" id="{615EB8BA-47E1-DA03-CED1-43FD87D5CCD4}"/>
+              </a:ext>
+            </a:extLst>
+          </p:cNvPr>
+          <p:cNvPicPr>
+            <a:picLocks noChangeAspect="1" noChangeArrowheads="1"/>
+          </p:cNvPicPr>
+          <p:nvPr/>
+        </p:nvPicPr>
+        <p:blipFill>
+          <a:blip r:embed="rId2">
+            <a:extLst>
+              <a:ext uri="{28A0092B-C50C-407E-A947-70E740481C1C}">
+                <a14:useLocalDpi xmlns:a14="http://schemas.microsoft.com/office/drawing/2010/main" val="0"/>
+              </a:ext>
+            </a:extLst>
+          </a:blip>
+          <a:srcRect/>
+          <a:stretch>
+            <a:fillRect/>
+          </a:stretch>
+        </p:blipFill>
+        <p:spPr bwMode="auto">
+          <a:xfrm>
+            <a:off x="1362456" y="241668"/>
+            <a:ext cx="9115776" cy="6374663"/>
+          </a:xfrm>
+          <a:prstGeom prst="rect">
+            <a:avLst/>
+          </a:prstGeom>
+          <a:noFill/>
+          <a:extLst>
+            <a:ext uri="{909E8E84-426E-40DD-AFC4-6F175D3DCCD1}">
+              <a14:hiddenFill xmlns:a14="http://schemas.microsoft.com/office/drawing/2010/main">
+                <a:solidFill>
+                  <a:srgbClr val="FFFFFF"/>
+                </a:solidFill>
+              </a14:hiddenFill>
+            </a:ext>
+          </a:extLst>
+        </p:spPr>
+      </p:pic>
+    </p:spTree>
+    <p:extLst>
+      <p:ext uri="{BB962C8B-B14F-4D97-AF65-F5344CB8AC3E}">
+        <p14:creationId xmlns:p14="http://schemas.microsoft.com/office/powerpoint/2010/main" val="1209119531"/>
+      </p:ext>
+    </p:extLst>
+  </p:cSld>
+  <p:clrMapOvr>
+    <a:masterClrMapping/>
+  </p:clrMapOvr>
+  <p:timing>
+    <p:tnLst>
+      <p:par>
+        <p:cTn id="1" dur="indefinite" restart="never" nodeType="tmRoot">
+          <p:childTnLst>
+            <p:seq concurrent="1" nextAc="seek">
+              <p:cTn id="2" dur="indefinite" nodeType="mainSeq">
+                <p:childTnLst>
+                  <p:par>
+                    <p:cTn id="3" fill="hold">
+                      <p:stCondLst>
+                        <p:cond delay="indefinite"/>
+                      </p:stCondLst>
+                      <p:childTnLst>
+                        <p:par>
+                          <p:cTn id="4" fill="hold">
+                            <p:stCondLst>
+                              <p:cond delay="0"/>
+                            </p:stCondLst>
+                            <p:childTnLst>
+                              <p:par>
+                                <p:cTn id="5" presetID="1" presetClass="entr" presetSubtype="0" fill="hold" nodeType="clickEffect">
+                                  <p:stCondLst>
+                                    <p:cond delay="0"/>
+                                  </p:stCondLst>
+                                  <p:childTnLst>
+                                    <p:set>
+                                      <p:cBhvr>
+                                        <p:cTn id="6" dur="1" fill="hold">
+                                          <p:stCondLst>
+                                            <p:cond delay="0"/>
+                                          </p:stCondLst>
+                                        </p:cTn>
+                                        <p:tgtEl>
+                                          <p:spTgt spid="2"/>
+                                        </p:tgtEl>
+                                        <p:attrNameLst>
+                                          <p:attrName>style.visibility</p:attrName>
+                                        </p:attrNameLst>
+                                      </p:cBhvr>
+                                      <p:to>
+                                        <p:strVal val="visible"/>
+                                      </p:to>
+                                    </p:set>
+                                  </p:childTnLst>
+                                </p:cTn>
+                              </p:par>
+                            </p:childTnLst>
+                          </p:cTn>
+                        </p:par>
+                      </p:childTnLst>
+                    </p:cTn>
+                  </p:par>
+                </p:childTnLst>
+              </p:cTn>
+              <p:prevCondLst>
+                <p:cond evt="onPrev" delay="0">
+                  <p:tgtEl>
+                    <p:sldTgt/>
+                  </p:tgtEl>
+                </p:cond>
+              </p:prevCondLst>
+              <p:nextCondLst>
+                <p:cond evt="onNext" delay="0">
+                  <p:tgtEl>
+                    <p:sldTgt/>
+                  </p:tgtEl>
+                </p:cond>
+              </p:nextCondLst>
+            </p:seq>
+          </p:childTnLst>
+        </p:cTn>
+      </p:par>
+    </p:tnLst>
+  </p:timing>
+</p:sld>
+</file>
+
 <file path=ppt/theme/theme1.xml><?xml version="1.0" encoding="utf-8"?>
 <a:theme xmlns:a="http://schemas.openxmlformats.org/drawingml/2006/main" name="VanillaVTI">
   <a:themeElements>

</xml_diff>